<commit_message>
revised dh2019 panel presentation
</commit_message>
<xml_diff>
--- a/presentations/DH_2019/EndingsPanelPresentation.pptx
+++ b/presentations/DH_2019/EndingsPanelPresentation.pptx
@@ -4097,13 +4097,13 @@
           <a:p>
             <a:r>
               <a:rPr lang="en-US" dirty="0"/>
-              <a:t>Prioritize which features to keep or compromise in durable forms</a:t>
-            </a:r>
-          </a:p>
-          <a:p>
-            <a:r>
-              <a:rPr lang="en-US" dirty="0"/>
-              <a:t>Embrace the price for autonomy and longevity</a:t>
+              <a:t>Prioritize which features to keep or compromise in durable outputs</a:t>
+            </a:r>
+          </a:p>
+          <a:p>
+            <a:r>
+              <a:rPr lang="en-US" dirty="0"/>
+              <a:t>Embrace the costs for autonomy and longevity</a:t>
             </a:r>
           </a:p>
           <a:p>
@@ -4212,7 +4212,7 @@
           <a:p>
             <a:r>
               <a:rPr lang="en-US" dirty="0"/>
-              <a:t>Ruthless Conclusion</a:t>
+              <a:t>Conclusion</a:t>
             </a:r>
           </a:p>
         </p:txBody>
@@ -4240,10 +4240,40 @@
           <a:p>
             <a:r>
               <a:rPr lang="en-US" dirty="0"/>
-              <a:t>A ruthless ideal of your project’s future:</a:t>
-            </a:r>
-          </a:p>
-          <a:p>
+              <a:t>A ruthless ideal of your project’s outputs:</a:t>
+            </a:r>
+          </a:p>
+          <a:p>
+            <a:pPr marL="0" indent="0">
+              <a:buNone/>
+            </a:pPr>
+            <a:br>
+              <a:rPr lang="en-US" dirty="0"/>
+            </a:br>
+            <a:br>
+              <a:rPr lang="en-US" dirty="0"/>
+            </a:br>
+            <a:br>
+              <a:rPr lang="en-US" dirty="0"/>
+            </a:br>
+            <a:br>
+              <a:rPr lang="en-US" dirty="0"/>
+            </a:br>
+            <a:br>
+              <a:rPr lang="en-US" dirty="0"/>
+            </a:br>
+            <a:br>
+              <a:rPr lang="en-US" dirty="0"/>
+            </a:br>
+            <a:br>
+              <a:rPr lang="en-US" dirty="0"/>
+            </a:br>
+            <a:r>
+              <a:rPr lang="en-CA" dirty="0">
+                <a:hlinkClick r:id="rId3"/>
+              </a:rPr>
+              <a:t>https://github.com/projectEndings/Endings</a:t>
+            </a:r>
             <a:endParaRPr lang="en-US" dirty="0"/>
           </a:p>
           <a:p>
@@ -4272,14 +4302,14 @@
           <p:nvPr/>
         </p:nvPicPr>
         <p:blipFill>
-          <a:blip r:embed="rId3"/>
+          <a:blip r:embed="rId4"/>
           <a:stretch>
             <a:fillRect/>
           </a:stretch>
         </p:blipFill>
         <p:spPr>
           <a:xfrm>
-            <a:off x="4406900" y="3105150"/>
+            <a:off x="2307643" y="3105150"/>
             <a:ext cx="3378200" cy="647700"/>
           </a:xfrm>
           <a:prstGeom prst="rect">
@@ -4731,12 +4761,8 @@
               <a:buNone/>
             </a:pPr>
             <a:r>
-              <a:rPr lang="en-US"/>
-              <a:t>       Team Scope                       Library                            </a:t>
-            </a:r>
-            <a:r>
-              <a:rPr lang="en-US" dirty="0"/>
-              <a:t>Sys-admin</a:t>
+              <a:rPr lang="en-US" dirty="0"/>
+              <a:t>       Team Scope                       Library                              Systems</a:t>
             </a:r>
           </a:p>
           <a:p>
@@ -4767,11 +4793,11 @@
             </a:r>
             <a:r>
               <a:rPr lang="en-US" dirty="0" err="1"/>
-              <a:t>UVic</a:t>
-            </a:r>
-            <a:r>
-              <a:rPr lang="en-US" dirty="0"/>
-              <a:t> 1/10 KCL           modest to Stanford      secure? ask Rosenzweig</a:t>
+              <a:t>Uvic</a:t>
+            </a:r>
+            <a:r>
+              <a:rPr lang="en-US" dirty="0"/>
+              <a:t> is 1/10 KCL        modest to Stanford      secure? ask Rosenzweig</a:t>
             </a:r>
           </a:p>
           <a:p>
@@ -4990,42 +5016,42 @@
           <a:p>
             <a:r>
               <a:rPr lang="en-US" dirty="0"/>
-              <a:t>Survey and interviews reveal range of possible risks:</a:t>
+              <a:t>Endings project survey and interviews reveal:</a:t>
             </a:r>
           </a:p>
           <a:p>
             <a:pPr lvl="1"/>
             <a:r>
               <a:rPr lang="en-US" dirty="0"/>
-              <a:t>Technical / Security of your stuff</a:t>
+              <a:t>Technical / security problems with your stuff</a:t>
             </a:r>
           </a:p>
           <a:p>
             <a:pPr lvl="1"/>
             <a:r>
               <a:rPr lang="en-US" dirty="0"/>
-              <a:t>Technical / Security of technology you depend on</a:t>
+              <a:t>Technical / security problems with stuff your stuff depends on</a:t>
             </a:r>
           </a:p>
           <a:p>
             <a:pPr lvl="1"/>
             <a:r>
               <a:rPr lang="en-US" dirty="0"/>
-              <a:t>Administrative / Institutional Support</a:t>
+              <a:t>Administrative / institutional support fails</a:t>
             </a:r>
           </a:p>
           <a:p>
             <a:pPr lvl="1"/>
             <a:r>
               <a:rPr lang="en-US" dirty="0"/>
-              <a:t>Key Personnel</a:t>
+              <a:t>Key personnel or skills lost</a:t>
             </a:r>
           </a:p>
           <a:p>
             <a:pPr lvl="1"/>
             <a:r>
               <a:rPr lang="en-US" dirty="0"/>
-              <a:t>Financial</a:t>
+              <a:t>Financial issues</a:t>
             </a:r>
           </a:p>
           <a:p>
@@ -5158,7 +5184,19 @@
           <a:p>
             <a:r>
               <a:rPr lang="en-US" dirty="0"/>
-              <a:t>Many of our projects don’t do well on our own (ruthless) questionnaire </a:t>
+              <a:t>We have chosen poorly </a:t>
+            </a:r>
+          </a:p>
+          <a:p>
+            <a:r>
+              <a:rPr lang="en-US" dirty="0"/>
+              <a:t>We have chosen wisely</a:t>
+            </a:r>
+          </a:p>
+          <a:p>
+            <a:r>
+              <a:rPr lang="en-US" dirty="0"/>
+              <a:t>Endings project’s ruthless questionnaire </a:t>
             </a:r>
             <a:br>
               <a:rPr lang="en-US" dirty="0"/>
@@ -5180,13 +5218,7 @@
           <a:p>
             <a:r>
               <a:rPr lang="en-US" dirty="0"/>
-              <a:t>We have chosen poorly </a:t>
-            </a:r>
-          </a:p>
-          <a:p>
-            <a:r>
-              <a:rPr lang="en-US" dirty="0"/>
-              <a:t>We have chosen wisely</a:t>
+              <a:t>Many of our own projects don’t do well </a:t>
             </a:r>
           </a:p>
           <a:p>
@@ -5313,7 +5345,7 @@
           <a:p>
             <a:r>
               <a:rPr lang="en-US" dirty="0"/>
-              <a:t>Endings project seeks truth/failure and offers lessons learned</a:t>
+              <a:t>Endings project sought failure and promises lessons learned</a:t>
             </a:r>
           </a:p>
           <a:p>
@@ -5331,7 +5363,7 @@
           <a:p>
             <a:r>
               <a:rPr lang="en-US" dirty="0"/>
-              <a:t>Accept short-term costs for that longevity</a:t>
+              <a:t>Accept short-term implications for that longevity</a:t>
             </a:r>
           </a:p>
           <a:p>
@@ -5588,19 +5620,19 @@
           <a:p>
             <a:r>
               <a:rPr lang="en-US" dirty="0"/>
-              <a:t>Ruthless: XML, HTML, CSS, JavaScript, media</a:t>
-            </a:r>
-          </a:p>
-          <a:p>
-            <a:r>
-              <a:rPr lang="en-US" dirty="0"/>
-              <a:t>Not ruthless: DB, server-side scripts, 3rd party libraries</a:t>
-            </a:r>
-          </a:p>
-          <a:p>
-            <a:r>
-              <a:rPr lang="en-US" dirty="0"/>
-              <a:t>Concessions: complex search, map </a:t>
+              <a:t>Ruthless: Valid HTML, Cascading Style Sheets, JavaScript</a:t>
+            </a:r>
+          </a:p>
+          <a:p>
+            <a:r>
+              <a:rPr lang="en-US" dirty="0"/>
+              <a:t>Not ruthless: database, server-side scripts, black-box libraries</a:t>
+            </a:r>
+          </a:p>
+          <a:p>
+            <a:r>
+              <a:rPr lang="en-US" dirty="0"/>
+              <a:t>Concessions: e.g. complex search, map </a:t>
             </a:r>
             <a:r>
               <a:rPr lang="en-US" dirty="0" err="1"/>

</xml_diff>